<commit_message>
Add Irving; Change folder names master, virtual, alpheretta
</commit_message>
<xml_diff>
--- a/Labs/70-535-00-Labs.pptx
+++ b/Labs/70-535-00-Labs.pptx
@@ -48,33 +48,33 @@
   <p:notesSz cx="6858000" cy="9144000"/>
   <p:embeddedFontLst>
     <p:embeddedFont>
-      <p:font typeface="Verdana" panose="020B0604030504040204" pitchFamily="34" charset="0"/>
+      <p:font typeface="Segoe UI Light" panose="020B0502040204020203" pitchFamily="34" charset="0"/>
       <p:regular r:id="rId36"/>
-      <p:bold r:id="rId37"/>
-      <p:italic r:id="rId38"/>
-      <p:boldItalic r:id="rId39"/>
-    </p:embeddedFont>
-    <p:embeddedFont>
-      <p:font typeface="Consolas" panose="020B0609020204030204" pitchFamily="49" charset="0"/>
-      <p:regular r:id="rId40"/>
-      <p:bold r:id="rId41"/>
-      <p:italic r:id="rId42"/>
-      <p:boldItalic r:id="rId43"/>
-    </p:embeddedFont>
-    <p:embeddedFont>
-      <p:font typeface="Segoe UI Light" panose="020B0502040204020203" pitchFamily="34" charset="0"/>
-      <p:regular r:id="rId44"/>
-      <p:italic r:id="rId45"/>
+      <p:italic r:id="rId37"/>
     </p:embeddedFont>
     <p:embeddedFont>
       <p:font typeface="Segoe UI" panose="020B0502040204020203" pitchFamily="34" charset="0"/>
+      <p:regular r:id="rId38"/>
+      <p:bold r:id="rId39"/>
+      <p:italic r:id="rId40"/>
+      <p:boldItalic r:id="rId41"/>
+    </p:embeddedFont>
+    <p:embeddedFont>
+      <p:font typeface="Calibri" panose="020F0502020204030204" pitchFamily="34" charset="0"/>
+      <p:regular r:id="rId42"/>
+      <p:bold r:id="rId43"/>
+      <p:italic r:id="rId44"/>
+      <p:boldItalic r:id="rId45"/>
+    </p:embeddedFont>
+    <p:embeddedFont>
+      <p:font typeface="Verdana" panose="020B0604030504040204" pitchFamily="34" charset="0"/>
       <p:regular r:id="rId46"/>
       <p:bold r:id="rId47"/>
       <p:italic r:id="rId48"/>
       <p:boldItalic r:id="rId49"/>
     </p:embeddedFont>
     <p:embeddedFont>
-      <p:font typeface="Calibri" panose="020F0502020204030204" pitchFamily="34" charset="0"/>
+      <p:font typeface="Consolas" panose="020B0609020204030204" pitchFamily="49" charset="0"/>
       <p:regular r:id="rId50"/>
       <p:bold r:id="rId51"/>
       <p:italic r:id="rId52"/>
@@ -391,7 +391,7 @@
           <a:p>
             <a:fld id="{7D784404-57E5-4341-9230-5EC072B8C3C5}" type="datetimeFigureOut">
               <a:rPr lang="en-US" smtClean="0"/>
-              <a:t>5/14/2018</a:t>
+              <a:t>5/16/2018</a:t>
             </a:fld>
             <a:endParaRPr lang="en-US"/>
           </a:p>
@@ -568,7 +568,7 @@
           <a:p>
             <a:fld id="{9933EFA3-31EF-403B-8080-9776000D59FF}" type="datetimeFigureOut">
               <a:rPr lang="en-US" smtClean="0"/>
-              <a:t>5/14/2018</a:t>
+              <a:t>5/16/2018</a:t>
             </a:fld>
             <a:endParaRPr lang="en-US" dirty="0"/>
           </a:p>
@@ -5462,7 +5462,7 @@
           <a:p>
             <a:fld id="{EA2B2ED8-C573-45EF-BF68-CEC19505703A}" type="datetime8">
               <a:rPr lang="en-US" smtClean="0"/>
-              <a:t>5/14/2018 12:37 PM</a:t>
+              <a:t>5/16/2018 2:51 PM</a:t>
             </a:fld>
             <a:endParaRPr lang="en-US" dirty="0"/>
           </a:p>
@@ -5697,7 +5697,7 @@
           <a:p>
             <a:fld id="{90EC29EE-A8AD-4CE0-9C0B-116E0D4D7533}" type="datetime8">
               <a:rPr lang="en-US" smtClean="0"/>
-              <a:t>5/14/2018 12:37 PM</a:t>
+              <a:t>5/16/2018 2:51 PM</a:t>
             </a:fld>
             <a:endParaRPr lang="en-US" dirty="0"/>
           </a:p>
@@ -6818,7 +6818,7 @@
           <a:p>
             <a:fld id="{38EEC551-8CDA-4EB6-89BB-2A86C9F091C8}" type="datetime8">
               <a:rPr lang="en-US" smtClean="0"/>
-              <a:t>5/14/2018 12:37 PM</a:t>
+              <a:t>5/16/2018 2:51 PM</a:t>
             </a:fld>
             <a:endParaRPr lang="en-US" dirty="0"/>
           </a:p>
@@ -30448,7 +30448,16 @@
           <a:bodyPr/>
           <a:lstStyle/>
           <a:p>
-            <a:endParaRPr lang="en-US"/>
+            <a:r>
+              <a:rPr lang="en-US" sz="2400" dirty="0">
+                <a:hlinkClick r:id="rId2"/>
+              </a:rPr>
+              <a:t>http://github.com/guruskill/70-535</a:t>
+            </a:r>
+            <a:r>
+              <a:rPr lang="en-US" sz="2400" dirty="0"/>
+              <a:t>    Labs/</a:t>
+            </a:r>
           </a:p>
         </p:txBody>
       </p:sp>
@@ -30623,8 +30632,8 @@
         </p:nvSpPr>
         <p:spPr>
           <a:xfrm>
-            <a:off x="1678095" y="6589194"/>
-            <a:ext cx="9432321" cy="308050"/>
+            <a:off x="550607" y="6490874"/>
+            <a:ext cx="10559810" cy="308050"/>
           </a:xfrm>
         </p:spPr>
         <p:txBody>
@@ -30632,17 +30641,17 @@
           <a:lstStyle/>
           <a:p>
             <a:r>
-              <a:rPr lang="en-US" dirty="0"/>
+              <a:rPr lang="en-US" sz="2000" dirty="0"/>
               <a:t>Lab Slide Location: </a:t>
             </a:r>
             <a:r>
-              <a:rPr lang="en-US" dirty="0">
+              <a:rPr lang="en-US" sz="2000" dirty="0">
                 <a:hlinkClick r:id="rId3"/>
               </a:rPr>
               <a:t>http://github.com/guruskill/70-535</a:t>
             </a:r>
             <a:r>
-              <a:rPr lang="en-US" dirty="0"/>
+              <a:rPr lang="en-US" sz="2000" dirty="0"/>
               <a:t>  Labs/70-535-00-Labs.pptx or .pdf</a:t>
             </a:r>
           </a:p>
@@ -32558,7 +32567,7 @@
 </file>
 
 <file path=ppt/slides/slide8.xml><?xml version="1.0" encoding="utf-8"?>
-<p:sld xmlns:a="http://schemas.openxmlformats.org/drawingml/2006/main" xmlns:r="http://schemas.openxmlformats.org/officeDocument/2006/relationships" xmlns:p="http://schemas.openxmlformats.org/presentationml/2006/main">
+<p:sld xmlns:a="http://schemas.openxmlformats.org/drawingml/2006/main" xmlns:r="http://schemas.openxmlformats.org/officeDocument/2006/relationships" xmlns:p="http://schemas.openxmlformats.org/presentationml/2006/main" show="0">
   <p:cSld>
     <p:spTree>
       <p:nvGrpSpPr>

</xml_diff>